<commit_message>
Fix minor errors referencing person instead of student
</commit_message>
<xml_diff>
--- a/docs/diagrams/StorageComponentClassDiagram.pptx
+++ b/docs/diagrams/StorageComponentClassDiagram.pptx
@@ -4739,16 +4739,16 @@
           <a:p>
             <a:pPr algn="ctr"/>
             <a:r>
-              <a:rPr lang="en-US" sz="1050" b="1" dirty="0" err="1">
+              <a:rPr lang="en-US" sz="1000" b="1" dirty="0" err="1">
                 <a:solidFill>
                   <a:schemeClr val="accent6">
                     <a:lumMod val="75000"/>
                   </a:schemeClr>
                 </a:solidFill>
               </a:rPr>
-              <a:t>XmlAdaptedPerson</a:t>
-            </a:r>
-            <a:endParaRPr lang="en-SG" sz="1050" b="1" dirty="0">
+              <a:t>XmlAdaptedStudent</a:t>
+            </a:r>
+            <a:endParaRPr lang="en-SG" sz="1000" b="1" dirty="0">
               <a:solidFill>
                 <a:schemeClr val="accent6">
                   <a:lumMod val="75000"/>

</xml_diff>